<commit_message>
Aggiunti grafici a presentazione
</commit_message>
<xml_diff>
--- a/consegna/BankRobbery.pptx
+++ b/consegna/BankRobbery.pptx
@@ -3537,7 +3537,7 @@
                   <a:srgbClr val="FFC000"/>
                 </a:solidFill>
               </a:rPr>
-              <a:t>Gianluca Tumminelli</a:t>
+              <a:t>Tumminelli Gianluca</a:t>
             </a:r>
           </a:p>
         </p:txBody>
@@ -4756,36 +4756,57 @@
           </a:p>
         </p:txBody>
       </p:sp>
-      <p:sp>
-        <p:nvSpPr>
-          <p:cNvPr id="3" name="risultati">
-            <a:extLst>
-              <a:ext uri="{FF2B5EF4-FFF2-40B4-BE49-F238E27FC236}">
-                <a16:creationId xmlns:a16="http://schemas.microsoft.com/office/drawing/2014/main" id="{99F9DC59-D77E-4DF1-B722-BE6FCD6B92BF}"/>
-              </a:ext>
-            </a:extLst>
-          </p:cNvPr>
-          <p:cNvSpPr>
-            <a:spLocks noGrp="1"/>
-          </p:cNvSpPr>
+      <p:pic>
+        <p:nvPicPr>
+          <p:cNvPr id="4" name="Segnaposto contenuto 3" descr="Immagine che contiene mappa, testo&#10;&#10;Descrizione generata automaticamente">
+            <a:extLst>
+              <a:ext uri="{FF2B5EF4-FFF2-40B4-BE49-F238E27FC236}">
+                <a16:creationId xmlns:a16="http://schemas.microsoft.com/office/drawing/2014/main" id="{E1F5ADAE-CA2C-47BA-85C8-230BCBF41F68}"/>
+              </a:ext>
+            </a:extLst>
+          </p:cNvPr>
+          <p:cNvPicPr>
+            <a:picLocks noGrp="1" noChangeAspect="1"/>
+          </p:cNvPicPr>
           <p:nvPr>
             <p:ph sz="half" idx="1"/>
           </p:nvPr>
-        </p:nvSpPr>
-        <p:spPr>
-          <a:xfrm>
-            <a:off x="838760" y="2923941"/>
-            <a:ext cx="6304989" cy="3544830"/>
-          </a:xfrm>
-        </p:spPr>
-        <p:txBody>
-          <a:bodyPr/>
-          <a:lstStyle/>
-          <a:p>
-            <a:endParaRPr lang="it-IT"/>
-          </a:p>
-        </p:txBody>
-      </p:sp>
+        </p:nvPicPr>
+        <p:blipFill>
+          <a:blip r:embed="rId2">
+            <a:extLst>
+              <a:ext uri="{28A0092B-C50C-407E-A947-70E740481C1C}">
+                <a14:useLocalDpi xmlns:a14="http://schemas.microsoft.com/office/drawing/2010/main" val="0"/>
+              </a:ext>
+            </a:extLst>
+          </a:blip>
+          <a:stretch>
+            <a:fillRect/>
+          </a:stretch>
+        </p:blipFill>
+        <p:spPr>
+          <a:xfrm>
+            <a:off x="958885" y="2864440"/>
+            <a:ext cx="5989099" cy="3544888"/>
+          </a:xfrm>
+          <a:prstGeom prst="rect">
+            <a:avLst/>
+          </a:prstGeom>
+          <a:ln w="38100" cap="sq">
+            <a:solidFill>
+              <a:srgbClr val="000000"/>
+            </a:solidFill>
+            <a:miter lim="800000"/>
+          </a:ln>
+          <a:effectLst>
+            <a:outerShdw blurRad="57150" dist="50800" dir="2700000" algn="tl" rotWithShape="0">
+              <a:srgbClr val="000000">
+                <a:alpha val="40000"/>
+              </a:srgbClr>
+            </a:outerShdw>
+          </a:effectLst>
+        </p:spPr>
+      </p:pic>
       <p:pic>
         <p:nvPicPr>
           <p:cNvPr id="7" name="AEG">
@@ -4803,7 +4824,7 @@
           </p:nvPr>
         </p:nvPicPr>
         <p:blipFill rotWithShape="1">
-          <a:blip r:embed="rId2">
+          <a:blip r:embed="rId3">
             <a:extLst>
               <a:ext uri="{28A0092B-C50C-407E-A947-70E740481C1C}">
                 <a14:useLocalDpi xmlns:a14="http://schemas.microsoft.com/office/drawing/2010/main" val="0"/>
@@ -5105,7 +5126,7 @@
                   <a:schemeClr val="bg1"/>
                 </a:solidFill>
               </a:rPr>
-              <a:t>I seguente attacco rappresenta una rapina effettuata da un team di rapinatori di alto livello. Essi punteranno a prendere il controllo di tutti i meccanismi di sicurezza della banca e a trovare una falla nelle routine degli addetti di sicurezza per poi poter forzare il caveau e prelevare ingenti quantità di denaro.</a:t>
+              <a:t>Il seguente attacco rappresenta una rapina effettuata da un team di rapinatori di alto livello. Essi punteranno a prendere il controllo di tutti i meccanismi di sicurezza della banca e a trovare una falla nelle routine degli addetti di sicurezza per poi poter forzare il caveau e prelevare ingenti quantità di denaro.</a:t>
             </a:r>
           </a:p>
         </p:txBody>
@@ -5125,11 +5146,11 @@
           <p:nvPr/>
         </p:nvPicPr>
         <p:blipFill>
-          <a:blip r:embed="rId3">
+          <a:blip r:embed="rId4">
             <a:extLst>
               <a:ext uri="{BEBA8EAE-BF5A-486C-A8C5-ECC9F3942E4B}">
                 <a14:imgProps xmlns:a14="http://schemas.microsoft.com/office/drawing/2010/main">
-                  <a14:imgLayer r:embed="rId4">
+                  <a14:imgLayer r:embed="rId5">
                     <a14:imgEffect>
                       <a14:artisticLineDrawing/>
                     </a14:imgEffect>
@@ -5140,7 +5161,7 @@
                 <a14:useLocalDpi xmlns:a14="http://schemas.microsoft.com/office/drawing/2010/main" val="0"/>
               </a:ext>
               <a:ext uri="{837473B0-CC2E-450A-ABE3-18F120FF3D39}">
-                <a1611:picAttrSrcUrl xmlns:a1611="http://schemas.microsoft.com/office/drawing/2016/11/main" r:id="rId5"/>
+                <a1611:picAttrSrcUrl xmlns:a1611="http://schemas.microsoft.com/office/drawing/2016/11/main" r:id="rId6"/>
               </a:ext>
             </a:extLst>
           </a:blip>
@@ -5319,36 +5340,57 @@
           </a:p>
         </p:txBody>
       </p:sp>
-      <p:sp>
-        <p:nvSpPr>
-          <p:cNvPr id="3" name="risultati">
-            <a:extLst>
-              <a:ext uri="{FF2B5EF4-FFF2-40B4-BE49-F238E27FC236}">
-                <a16:creationId xmlns:a16="http://schemas.microsoft.com/office/drawing/2014/main" id="{99F9DC59-D77E-4DF1-B722-BE6FCD6B92BF}"/>
-              </a:ext>
-            </a:extLst>
-          </p:cNvPr>
-          <p:cNvSpPr>
-            <a:spLocks noGrp="1"/>
-          </p:cNvSpPr>
+      <p:pic>
+        <p:nvPicPr>
+          <p:cNvPr id="4" name="Segnaposto contenuto 3" descr="Immagine che contiene testo, mappa&#10;&#10;Descrizione generata automaticamente">
+            <a:extLst>
+              <a:ext uri="{FF2B5EF4-FFF2-40B4-BE49-F238E27FC236}">
+                <a16:creationId xmlns:a16="http://schemas.microsoft.com/office/drawing/2014/main" id="{F5C407F8-3770-4840-ABF6-0F7DC93E7B0F}"/>
+              </a:ext>
+            </a:extLst>
+          </p:cNvPr>
+          <p:cNvPicPr>
+            <a:picLocks noGrp="1" noChangeAspect="1"/>
+          </p:cNvPicPr>
           <p:nvPr>
             <p:ph sz="half" idx="1"/>
           </p:nvPr>
-        </p:nvSpPr>
-        <p:spPr>
-          <a:xfrm>
-            <a:off x="951158" y="3041864"/>
-            <a:ext cx="6497295" cy="3436215"/>
-          </a:xfrm>
-        </p:spPr>
-        <p:txBody>
-          <a:bodyPr/>
-          <a:lstStyle/>
-          <a:p>
-            <a:endParaRPr lang="it-IT"/>
-          </a:p>
-        </p:txBody>
-      </p:sp>
+        </p:nvPicPr>
+        <p:blipFill>
+          <a:blip r:embed="rId2">
+            <a:extLst>
+              <a:ext uri="{28A0092B-C50C-407E-A947-70E740481C1C}">
+                <a14:useLocalDpi xmlns:a14="http://schemas.microsoft.com/office/drawing/2010/main" val="0"/>
+              </a:ext>
+            </a:extLst>
+          </a:blip>
+          <a:stretch>
+            <a:fillRect/>
+          </a:stretch>
+        </p:blipFill>
+        <p:spPr>
+          <a:xfrm>
+            <a:off x="921407" y="3032556"/>
+            <a:ext cx="6382419" cy="3436938"/>
+          </a:xfrm>
+          <a:prstGeom prst="rect">
+            <a:avLst/>
+          </a:prstGeom>
+          <a:ln w="38100" cap="sq">
+            <a:solidFill>
+              <a:srgbClr val="000000"/>
+            </a:solidFill>
+            <a:miter lim="800000"/>
+          </a:ln>
+          <a:effectLst>
+            <a:outerShdw blurRad="57150" dist="50800" dir="2700000" algn="tl" rotWithShape="0">
+              <a:srgbClr val="000000">
+                <a:alpha val="40000"/>
+              </a:srgbClr>
+            </a:outerShdw>
+          </a:effectLst>
+        </p:spPr>
+      </p:pic>
       <p:pic>
         <p:nvPicPr>
           <p:cNvPr id="7" name="AEG">
@@ -5366,7 +5408,7 @@
           </p:nvPr>
         </p:nvPicPr>
         <p:blipFill rotWithShape="1">
-          <a:blip r:embed="rId2">
+          <a:blip r:embed="rId3">
             <a:extLst>
               <a:ext uri="{28A0092B-C50C-407E-A947-70E740481C1C}">
                 <a14:useLocalDpi xmlns:a14="http://schemas.microsoft.com/office/drawing/2010/main" val="0"/>
@@ -5711,11 +5753,11 @@
           <p:nvPr/>
         </p:nvPicPr>
         <p:blipFill>
-          <a:blip r:embed="rId3">
+          <a:blip r:embed="rId4">
             <a:extLst>
               <a:ext uri="{BEBA8EAE-BF5A-486C-A8C5-ECC9F3942E4B}">
                 <a14:imgProps xmlns:a14="http://schemas.microsoft.com/office/drawing/2010/main">
-                  <a14:imgLayer r:embed="rId4">
+                  <a14:imgLayer r:embed="rId5">
                     <a14:imgEffect>
                       <a14:artisticLineDrawing/>
                     </a14:imgEffect>
@@ -5726,7 +5768,7 @@
                 <a14:useLocalDpi xmlns:a14="http://schemas.microsoft.com/office/drawing/2010/main" val="0"/>
               </a:ext>
               <a:ext uri="{837473B0-CC2E-450A-ABE3-18F120FF3D39}">
-                <a1611:picAttrSrcUrl xmlns:a1611="http://schemas.microsoft.com/office/drawing/2016/11/main" r:id="rId5"/>
+                <a1611:picAttrSrcUrl xmlns:a1611="http://schemas.microsoft.com/office/drawing/2016/11/main" r:id="rId6"/>
               </a:ext>
             </a:extLst>
           </a:blip>
@@ -5905,36 +5947,57 @@
           </a:p>
         </p:txBody>
       </p:sp>
-      <p:sp>
-        <p:nvSpPr>
-          <p:cNvPr id="3" name="risultati">
-            <a:extLst>
-              <a:ext uri="{FF2B5EF4-FFF2-40B4-BE49-F238E27FC236}">
-                <a16:creationId xmlns:a16="http://schemas.microsoft.com/office/drawing/2014/main" id="{99F9DC59-D77E-4DF1-B722-BE6FCD6B92BF}"/>
-              </a:ext>
-            </a:extLst>
-          </p:cNvPr>
-          <p:cNvSpPr>
-            <a:spLocks noGrp="1"/>
-          </p:cNvSpPr>
+      <p:pic>
+        <p:nvPicPr>
+          <p:cNvPr id="4" name="Segnaposto contenuto 3" descr="Immagine che contiene testo, mappa&#10;&#10;Descrizione generata automaticamente">
+            <a:extLst>
+              <a:ext uri="{FF2B5EF4-FFF2-40B4-BE49-F238E27FC236}">
+                <a16:creationId xmlns:a16="http://schemas.microsoft.com/office/drawing/2014/main" id="{83B7A786-3630-431E-AA68-3056E5FFD699}"/>
+              </a:ext>
+            </a:extLst>
+          </p:cNvPr>
+          <p:cNvPicPr>
+            <a:picLocks noGrp="1" noChangeAspect="1"/>
+          </p:cNvPicPr>
           <p:nvPr>
             <p:ph sz="half" idx="1"/>
           </p:nvPr>
-        </p:nvSpPr>
-        <p:spPr>
-          <a:xfrm>
-            <a:off x="838200" y="2541651"/>
-            <a:ext cx="4757781" cy="3914288"/>
-          </a:xfrm>
-        </p:spPr>
-        <p:txBody>
-          <a:bodyPr/>
-          <a:lstStyle/>
-          <a:p>
-            <a:endParaRPr lang="it-IT"/>
-          </a:p>
-        </p:txBody>
-      </p:sp>
+        </p:nvPicPr>
+        <p:blipFill>
+          <a:blip r:embed="rId2">
+            <a:extLst>
+              <a:ext uri="{28A0092B-C50C-407E-A947-70E740481C1C}">
+                <a14:useLocalDpi xmlns:a14="http://schemas.microsoft.com/office/drawing/2010/main" val="0"/>
+              </a:ext>
+            </a:extLst>
+          </a:blip>
+          <a:stretch>
+            <a:fillRect/>
+          </a:stretch>
+        </p:blipFill>
+        <p:spPr>
+          <a:xfrm>
+            <a:off x="679201" y="2739363"/>
+            <a:ext cx="5416799" cy="3505208"/>
+          </a:xfrm>
+          <a:prstGeom prst="rect">
+            <a:avLst/>
+          </a:prstGeom>
+          <a:ln w="38100" cap="sq">
+            <a:solidFill>
+              <a:srgbClr val="000000"/>
+            </a:solidFill>
+            <a:miter lim="800000"/>
+          </a:ln>
+          <a:effectLst>
+            <a:outerShdw blurRad="57150" dist="50800" dir="2700000" algn="tl" rotWithShape="0">
+              <a:srgbClr val="000000">
+                <a:alpha val="40000"/>
+              </a:srgbClr>
+            </a:outerShdw>
+          </a:effectLst>
+        </p:spPr>
+      </p:pic>
       <p:pic>
         <p:nvPicPr>
           <p:cNvPr id="7" name="AEG">
@@ -5952,7 +6015,7 @@
           </p:nvPr>
         </p:nvPicPr>
         <p:blipFill rotWithShape="1">
-          <a:blip r:embed="rId2">
+          <a:blip r:embed="rId3">
             <a:extLst>
               <a:ext uri="{28A0092B-C50C-407E-A947-70E740481C1C}">
                 <a14:useLocalDpi xmlns:a14="http://schemas.microsoft.com/office/drawing/2010/main" val="0"/>
@@ -5964,8 +6027,8 @@
         </p:blipFill>
         <p:spPr>
           <a:xfrm>
-            <a:off x="5716149" y="2541651"/>
-            <a:ext cx="5840213" cy="3926423"/>
+            <a:off x="6304306" y="2739362"/>
+            <a:ext cx="5252056" cy="3531000"/>
           </a:xfrm>
           <a:prstGeom prst="rect">
             <a:avLst/>
@@ -6235,11 +6298,11 @@
           <p:nvPr/>
         </p:nvPicPr>
         <p:blipFill>
-          <a:blip r:embed="rId3">
+          <a:blip r:embed="rId4">
             <a:extLst>
               <a:ext uri="{BEBA8EAE-BF5A-486C-A8C5-ECC9F3942E4B}">
                 <a14:imgProps xmlns:a14="http://schemas.microsoft.com/office/drawing/2010/main">
-                  <a14:imgLayer r:embed="rId4">
+                  <a14:imgLayer r:embed="rId5">
                     <a14:imgEffect>
                       <a14:artisticLineDrawing/>
                     </a14:imgEffect>
@@ -6250,7 +6313,7 @@
                 <a14:useLocalDpi xmlns:a14="http://schemas.microsoft.com/office/drawing/2010/main" val="0"/>
               </a:ext>
               <a:ext uri="{837473B0-CC2E-450A-ABE3-18F120FF3D39}">
-                <a1611:picAttrSrcUrl xmlns:a1611="http://schemas.microsoft.com/office/drawing/2016/11/main" r:id="rId5"/>
+                <a1611:picAttrSrcUrl xmlns:a1611="http://schemas.microsoft.com/office/drawing/2016/11/main" r:id="rId6"/>
               </a:ext>
             </a:extLst>
           </a:blip>
@@ -6282,8 +6345,8 @@
         </p:nvSpPr>
         <p:spPr>
           <a:xfrm>
-            <a:off x="838200" y="1316391"/>
-            <a:ext cx="10718162" cy="923330"/>
+            <a:off x="652182" y="1316391"/>
+            <a:ext cx="10904180" cy="1200329"/>
           </a:xfrm>
           <a:prstGeom prst="rect">
             <a:avLst/>
@@ -6302,17 +6365,7 @@
                   <a:schemeClr val="bg1"/>
                 </a:solidFill>
               </a:rPr>
-              <a:t>Per concludere abbiamo effettuare una simulazione generica per visualizzare quali gli attacchi più probabili per una banca e definire quindi quali sono gli elementi in cui essa deve focalizzarsi per aumentare la sua sicurezza.</a:t>
-            </a:r>
-          </a:p>
-          <a:p>
-            <a:r>
-              <a:rPr lang="it-IT">
-                <a:solidFill>
-                  <a:schemeClr val="bg1"/>
-                </a:solidFill>
-              </a:rPr>
-              <a:t>Come ci aspettavamo….</a:t>
+              <a:t>Per concludere abbiamo effettuare una simulazione generica per visualizzare quali gli attacchi più probabili per una banca e definire quindi quali sono gli elementi in cui essa deve focalizzarsi per aumentare la sua sicurezza e come ci aspettavamo l’attacco preferito risulta essere il furto di credenziali, siano essere degli utenti tramite il phishing che del direttore tramite un attacco al sistema informatico.</a:t>
             </a:r>
           </a:p>
         </p:txBody>

</xml_diff>